<commit_message>
Delete questions from Ákos pptx
</commit_message>
<xml_diff>
--- a/starter-files/lists-tables-and-basic-refactoring/Oxygen_21_NewBasicFeatures.pptx
+++ b/starter-files/lists-tables-and-basic-refactoring/Oxygen_21_NewBasicFeatures.pptx
@@ -5,10 +5,10 @@
     <p:sldMasterId id="2147483648" r:id="rId4"/>
   </p:sldMasterIdLst>
   <p:notesMasterIdLst>
-    <p:notesMasterId r:id="rId24"/>
+    <p:notesMasterId r:id="rId23"/>
   </p:notesMasterIdLst>
   <p:handoutMasterIdLst>
-    <p:handoutMasterId r:id="rId25"/>
+    <p:handoutMasterId r:id="rId24"/>
   </p:handoutMasterIdLst>
   <p:sldIdLst>
     <p:sldId id="341" r:id="rId5"/>
@@ -29,7 +29,6 @@
     <p:sldId id="366" r:id="rId20"/>
     <p:sldId id="365" r:id="rId21"/>
     <p:sldId id="361" r:id="rId22"/>
-    <p:sldId id="342" r:id="rId23"/>
   </p:sldIdLst>
   <p:sldSz cx="12192000" cy="6858000"/>
   <p:notesSz cx="6858000" cy="9144000"/>
@@ -151,7 +150,6 @@
             <p14:sldId id="366"/>
             <p14:sldId id="365"/>
             <p14:sldId id="361"/>
-            <p14:sldId id="342"/>
           </p14:sldIdLst>
         </p14:section>
       </p14:sectionLst>
@@ -286,7 +284,7 @@
           <a:p>
             <a:fld id="{C1D822D6-1337-4E2C-A3A7-DD1C0415F2DA}" type="datetimeFigureOut">
               <a:rPr lang="en-US" smtClean="0"/>
-              <a:t>2/6/2020</a:t>
+              <a:t>2/7/2020</a:t>
             </a:fld>
             <a:endParaRPr lang="en-US"/>
           </a:p>
@@ -451,7 +449,7 @@
           <a:p>
             <a:fld id="{FA17B1A6-FEA2-440B-A62C-D94CE8C4FAE0}" type="datetimeFigureOut">
               <a:rPr lang="en-US" smtClean="0"/>
-              <a:t>2/6/2020</a:t>
+              <a:t>2/7/2020</a:t>
             </a:fld>
             <a:endParaRPr lang="en-US"/>
           </a:p>
@@ -12442,143 +12440,6 @@
     <p:extLst>
       <p:ext uri="{BB962C8B-B14F-4D97-AF65-F5344CB8AC3E}">
         <p14:creationId xmlns:p14="http://schemas.microsoft.com/office/powerpoint/2010/main" val="1717478771"/>
-      </p:ext>
-    </p:extLst>
-  </p:cSld>
-  <p:clrMapOvr>
-    <a:masterClrMapping/>
-  </p:clrMapOvr>
-</p:sld>
-</file>
-
-<file path=ppt/slides/slide19.xml><?xml version="1.0" encoding="utf-8"?>
-<p:sld xmlns:a="http://schemas.openxmlformats.org/drawingml/2006/main" xmlns:r="http://schemas.openxmlformats.org/officeDocument/2006/relationships" xmlns:p="http://schemas.openxmlformats.org/presentationml/2006/main">
-  <p:cSld>
-    <p:spTree>
-      <p:nvGrpSpPr>
-        <p:cNvPr id="1" name=""/>
-        <p:cNvGrpSpPr/>
-        <p:nvPr/>
-      </p:nvGrpSpPr>
-      <p:grpSpPr>
-        <a:xfrm>
-          <a:off x="0" y="0"/>
-          <a:ext cx="0" cy="0"/>
-          <a:chOff x="0" y="0"/>
-          <a:chExt cx="0" cy="0"/>
-        </a:xfrm>
-      </p:grpSpPr>
-      <p:sp>
-        <p:nvSpPr>
-          <p:cNvPr id="8" name="Text Placeholder 7"/>
-          <p:cNvSpPr>
-            <a:spLocks noGrp="1"/>
-          </p:cNvSpPr>
-          <p:nvPr>
-            <p:ph type="body" sz="quarter" idx="13"/>
-          </p:nvPr>
-        </p:nvSpPr>
-        <p:spPr/>
-        <p:txBody>
-          <a:bodyPr/>
-          <a:lstStyle/>
-          <a:p>
-            <a:r>
-              <a:rPr lang="en-US" dirty="0"/>
-              <a:t>Questions</a:t>
-            </a:r>
-          </a:p>
-        </p:txBody>
-      </p:sp>
-      <p:sp>
-        <p:nvSpPr>
-          <p:cNvPr id="3" name="Footer Placeholder 2"/>
-          <p:cNvSpPr>
-            <a:spLocks noGrp="1"/>
-          </p:cNvSpPr>
-          <p:nvPr>
-            <p:ph type="ftr" sz="quarter" idx="3"/>
-          </p:nvPr>
-        </p:nvSpPr>
-        <p:spPr/>
-        <p:txBody>
-          <a:bodyPr/>
-          <a:lstStyle/>
-          <a:p>
-            <a:r>
-              <a:rPr lang="en-US"/>
-              <a:t>© Copyright 2017 DTC ENTERPRISE – The information contained herein is subject to change without notice.				.‹#›.</a:t>
-            </a:r>
-            <a:endParaRPr lang="en-US" dirty="0"/>
-          </a:p>
-        </p:txBody>
-      </p:sp>
-      <p:sp>
-        <p:nvSpPr>
-          <p:cNvPr id="9" name="Text Placeholder 8"/>
-          <p:cNvSpPr>
-            <a:spLocks noGrp="1"/>
-          </p:cNvSpPr>
-          <p:nvPr>
-            <p:ph type="body" sz="quarter" idx="15"/>
-          </p:nvPr>
-        </p:nvSpPr>
-        <p:spPr/>
-        <p:txBody>
-          <a:bodyPr/>
-          <a:lstStyle/>
-          <a:p>
-            <a:r>
-              <a:rPr lang="en-US" dirty="0"/>
-              <a:t>How to smart paste pictures (from video)</a:t>
-            </a:r>
-          </a:p>
-          <a:p>
-            <a:r>
-              <a:rPr lang="en-US" dirty="0"/>
-              <a:t>What is schema aware</a:t>
-            </a:r>
-          </a:p>
-          <a:p>
-            <a:r>
-              <a:rPr lang="en-US" dirty="0"/>
-              <a:t>How to generate output</a:t>
-            </a:r>
-          </a:p>
-          <a:p>
-            <a:r>
-              <a:rPr lang="en-US" dirty="0"/>
-              <a:t>Oxygen xml editor vs author</a:t>
-            </a:r>
-          </a:p>
-        </p:txBody>
-      </p:sp>
-      <p:sp>
-        <p:nvSpPr>
-          <p:cNvPr id="10" name="Text Placeholder 9"/>
-          <p:cNvSpPr>
-            <a:spLocks noGrp="1"/>
-          </p:cNvSpPr>
-          <p:nvPr>
-            <p:ph type="body" sz="quarter" idx="20"/>
-          </p:nvPr>
-        </p:nvSpPr>
-        <p:spPr/>
-        <p:txBody>
-          <a:bodyPr/>
-          <a:lstStyle/>
-          <a:p>
-            <a:r>
-              <a:rPr lang="en-US" dirty="0"/>
-              <a:t>… with subtitle</a:t>
-            </a:r>
-          </a:p>
-        </p:txBody>
-      </p:sp>
-    </p:spTree>
-    <p:extLst>
-      <p:ext uri="{BB962C8B-B14F-4D97-AF65-F5344CB8AC3E}">
-        <p14:creationId xmlns:p14="http://schemas.microsoft.com/office/powerpoint/2010/main" val="2828046954"/>
       </p:ext>
     </p:extLst>
   </p:cSld>
@@ -15745,9 +15606,12 @@
 </file>
 
 <file path=customXml/item1.xml><?xml version="1.0" encoding="utf-8"?>
-<p:properties xmlns:p="http://schemas.microsoft.com/office/2006/metadata/properties" xmlns:xsi="http://www.w3.org/2001/XMLSchema-instance" xmlns:pc="http://schemas.microsoft.com/office/infopath/2007/PartnerControls">
-  <documentManagement/>
-</p:properties>
+<?mso-contentType ?>
+<FormTemplates xmlns="http://schemas.microsoft.com/sharepoint/v3/contenttype/forms">
+  <Display>DocumentLibraryForm</Display>
+  <Edit>DocumentLibraryForm</Edit>
+  <New>DocumentLibraryForm</New>
+</FormTemplates>
 </file>
 
 <file path=customXml/item2.xml><?xml version="1.0" encoding="utf-8"?>
@@ -15921,26 +15785,15 @@
 </file>
 
 <file path=customXml/item3.xml><?xml version="1.0" encoding="utf-8"?>
-<?mso-contentType ?>
-<FormTemplates xmlns="http://schemas.microsoft.com/sharepoint/v3/contenttype/forms">
-  <Display>DocumentLibraryForm</Display>
-  <Edit>DocumentLibraryForm</Edit>
-  <New>DocumentLibraryForm</New>
-</FormTemplates>
+<p:properties xmlns:p="http://schemas.microsoft.com/office/2006/metadata/properties" xmlns:xsi="http://www.w3.org/2001/XMLSchema-instance" xmlns:pc="http://schemas.microsoft.com/office/infopath/2007/PartnerControls">
+  <documentManagement/>
+</p:properties>
 </file>
 
 <file path=customXml/itemProps1.xml><?xml version="1.0" encoding="utf-8"?>
-<ds:datastoreItem xmlns:ds="http://schemas.openxmlformats.org/officeDocument/2006/customXml" ds:itemID="{70A03083-A39B-46AC-95B4-1681637865DA}">
+<ds:datastoreItem xmlns:ds="http://schemas.openxmlformats.org/officeDocument/2006/customXml" ds:itemID="{E9848BD9-8F3E-4790-8484-57C58DC28D19}">
   <ds:schemaRefs>
-    <ds:schemaRef ds:uri="http://purl.org/dc/terms/"/>
-    <ds:schemaRef ds:uri="http://schemas.openxmlformats.org/package/2006/metadata/core-properties"/>
-    <ds:schemaRef ds:uri="http://schemas.microsoft.com/office/2006/documentManagement/types"/>
-    <ds:schemaRef ds:uri="339a5cc5-e509-46cb-85d8-ad6fd57304a0"/>
-    <ds:schemaRef ds:uri="http://purl.org/dc/elements/1.1/"/>
-    <ds:schemaRef ds:uri="http://schemas.microsoft.com/office/2006/metadata/properties"/>
-    <ds:schemaRef ds:uri="http://schemas.microsoft.com/office/infopath/2007/PartnerControls"/>
-    <ds:schemaRef ds:uri="http://www.w3.org/XML/1998/namespace"/>
-    <ds:schemaRef ds:uri="http://purl.org/dc/dcmitype/"/>
+    <ds:schemaRef ds:uri="http://schemas.microsoft.com/sharepoint/v3/contenttype/forms"/>
   </ds:schemaRefs>
 </ds:datastoreItem>
 </file>
@@ -15964,9 +15817,17 @@
 </file>
 
 <file path=customXml/itemProps3.xml><?xml version="1.0" encoding="utf-8"?>
-<ds:datastoreItem xmlns:ds="http://schemas.openxmlformats.org/officeDocument/2006/customXml" ds:itemID="{E9848BD9-8F3E-4790-8484-57C58DC28D19}">
+<ds:datastoreItem xmlns:ds="http://schemas.openxmlformats.org/officeDocument/2006/customXml" ds:itemID="{70A03083-A39B-46AC-95B4-1681637865DA}">
   <ds:schemaRefs>
-    <ds:schemaRef ds:uri="http://schemas.microsoft.com/sharepoint/v3/contenttype/forms"/>
+    <ds:schemaRef ds:uri="http://purl.org/dc/terms/"/>
+    <ds:schemaRef ds:uri="http://schemas.openxmlformats.org/package/2006/metadata/core-properties"/>
+    <ds:schemaRef ds:uri="http://schemas.microsoft.com/office/2006/documentManagement/types"/>
+    <ds:schemaRef ds:uri="339a5cc5-e509-46cb-85d8-ad6fd57304a0"/>
+    <ds:schemaRef ds:uri="http://purl.org/dc/elements/1.1/"/>
+    <ds:schemaRef ds:uri="http://schemas.microsoft.com/office/2006/metadata/properties"/>
+    <ds:schemaRef ds:uri="http://schemas.microsoft.com/office/infopath/2007/PartnerControls"/>
+    <ds:schemaRef ds:uri="http://www.w3.org/XML/1998/namespace"/>
+    <ds:schemaRef ds:uri="http://purl.org/dc/dcmitype/"/>
   </ds:schemaRefs>
 </ds:datastoreItem>
 </file>
</xml_diff>